<commit_message>
adjusted ppt and doc
</commit_message>
<xml_diff>
--- a/NFL_Draft_Trends_ppt.pptx
+++ b/NFL_Draft_Trends_ppt.pptx
@@ -10719,7 +10719,7 @@
             </a:pPr>
             <a:r>
               <a:rPr lang="en-US" sz="1600" dirty="0"/>
-              <a:t>We found there is a low positive correlation of 0.56 for our graph.</a:t>
+              <a:t>We found there is a low positive correlation of 0.11 for our graph.</a:t>
             </a:r>
           </a:p>
           <a:p>
@@ -10913,27 +10913,63 @@
           <a:lstStyle/>
           <a:p>
             <a:r>
-              <a:rPr lang="en-US" sz="1600" b="0">
+              <a:rPr lang="en-US" sz="1600" b="0" dirty="0">
                 <a:latin typeface="Arial"/>
               </a:rPr>
-              <a:t>- Summary of the project and findings</a:t>
+              <a:t>It can be determined based on the data that most teams who have a higher hit rate do </a:t>
             </a:r>
-          </a:p>
-          <a:p>
             <a:r>
               <a:rPr lang="en-US" sz="1600" b="0">
                 <a:latin typeface="Arial"/>
               </a:rPr>
-              <a:t>- Implications of the results</a:t>
+              <a:t>not always see </a:t>
             </a:r>
-          </a:p>
-          <a:p>
             <a:r>
-              <a:rPr lang="en-US" sz="1600" b="0">
+              <a:rPr lang="en-US" sz="1600" b="0" dirty="0">
                 <a:latin typeface="Arial"/>
               </a:rPr>
-              <a:t>- Recommendations based on the analysis</a:t>
+              <a:t>higher win rates which can equate to better output on the field</a:t>
             </a:r>
+          </a:p>
+          <a:p>
+            <a:pPr lvl="1"/>
+            <a:r>
+              <a:rPr lang="en-US" sz="1400" dirty="0">
+                <a:latin typeface="Arial"/>
+              </a:rPr>
+              <a:t>There is a high turnover of drafted players who do not received a second contract with their respective team</a:t>
+            </a:r>
+            <a:endParaRPr lang="en-US" sz="1400" b="0" dirty="0">
+              <a:latin typeface="Arial"/>
+            </a:endParaRPr>
+          </a:p>
+          <a:p>
+            <a:r>
+              <a:rPr lang="en-US" sz="1600" b="0" dirty="0">
+                <a:latin typeface="Arial"/>
+              </a:rPr>
+              <a:t>There are examples of successful teams both for and against the premise tha</a:t>
+            </a:r>
+            <a:r>
+              <a:rPr lang="en-US" sz="1600" dirty="0">
+                <a:latin typeface="Arial"/>
+              </a:rPr>
+              <a:t>t you need to sign your own players to ultimately see the higher win rate and/or more</a:t>
+            </a:r>
+            <a:endParaRPr lang="en-US" sz="1600" b="0" dirty="0">
+              <a:latin typeface="Arial"/>
+            </a:endParaRPr>
+          </a:p>
+          <a:p>
+            <a:r>
+              <a:rPr lang="en-US" sz="1600" dirty="0">
+                <a:latin typeface="Arial"/>
+              </a:rPr>
+              <a:t>Overall, it can be stated that there should be consideration to keep the players that best fit the respective team's system. Although, teams have shown being more conservative on their extensions and bringing in talent on the market can show consistent win percentages</a:t>
+            </a:r>
+            <a:endParaRPr lang="en-US" sz="1600" b="0" dirty="0">
+              <a:latin typeface="Arial"/>
+            </a:endParaRPr>
           </a:p>
         </p:txBody>
       </p:sp>
@@ -11486,7 +11522,7 @@
               <a:rPr lang="en-US" dirty="0">
                 <a:latin typeface="Arial"/>
               </a:rPr>
-              <a:t> round picks, determine cases where a 7</a:t>
+              <a:t> round picks, for example determine cases where a 7</a:t>
             </a:r>
             <a:r>
               <a:rPr lang="en-US" baseline="30000" dirty="0">
@@ -11498,7 +11534,19 @@
               <a:rPr lang="en-US" dirty="0">
                 <a:latin typeface="Arial"/>
               </a:rPr>
-              <a:t> round draftee performed better than a first</a:t>
+              <a:t> round draftee performed better than a 1</a:t>
+            </a:r>
+            <a:r>
+              <a:rPr lang="en-US" baseline="30000" dirty="0">
+                <a:latin typeface="Arial"/>
+              </a:rPr>
+              <a:t>st</a:t>
+            </a:r>
+            <a:r>
+              <a:rPr lang="en-US" dirty="0">
+                <a:latin typeface="Arial"/>
+              </a:rPr>
+              <a:t> </a:t>
             </a:r>
             <a:endParaRPr lang="en-US" b="0" dirty="0">
               <a:latin typeface="Arial"/>

</xml_diff>